<commit_message>
HMM deck update and report
</commit_message>
<xml_diff>
--- a/report/HMM_deck.pptx
+++ b/report/HMM_deck.pptx
@@ -508,46 +508,13 @@
           <a:p>
             <a:r>
               <a:rPr lang="en-US" dirty="0" smtClean="0"/>
-              <a:t>- Weather is often</a:t>
+              <a:t>Weather is often</a:t>
             </a:r>
             <a:r>
               <a:rPr lang="en-US" baseline="0" dirty="0" smtClean="0"/>
-              <a:t> very hard to predict even when we have a sense of the weather measures</a:t>
-            </a:r>
-          </a:p>
-          <a:p>
-            <a:pPr marL="171450" indent="-171450">
-              <a:buFontTx/>
-              <a:buChar char="-"/>
-            </a:pPr>
-            <a:r>
-              <a:rPr lang="en-US" dirty="0" smtClean="0"/>
-              <a:t>We have attempted to model weather events based on weather measures using a second order HMM</a:t>
-            </a:r>
-          </a:p>
-          <a:p>
-            <a:pPr marL="171450" indent="-171450">
-              <a:buFontTx/>
-              <a:buChar char="-"/>
-            </a:pPr>
-            <a:r>
-              <a:rPr lang="en-US" dirty="0" smtClean="0"/>
-              <a:t>9 hidden states representing weather events</a:t>
-            </a:r>
-          </a:p>
-          <a:p>
-            <a:pPr marL="171450" indent="-171450">
-              <a:buFontTx/>
-              <a:buChar char="-"/>
-            </a:pPr>
-            <a:r>
-              <a:rPr lang="en-US" dirty="0" smtClean="0"/>
-              <a:t>7 continuous</a:t>
-            </a:r>
-            <a:r>
-              <a:rPr lang="en-US" baseline="0" dirty="0" smtClean="0"/>
-              <a:t> real-valued weather measures are our observations (all seven observed for each weather event)</a:t>
-            </a:r>
+              <a:t> very hard to predict even when we have reliable instrumentation, especially in Boston! </a:t>
+            </a:r>
+            <a:endParaRPr lang="en-US" dirty="0"/>
           </a:p>
         </p:txBody>
       </p:sp>
@@ -568,7 +535,7 @@
           <a:p>
             <a:fld id="{855C7538-5F66-FD46-9CCD-0484E66EB419}" type="slidenum">
               <a:rPr lang="en-US" smtClean="0"/>
-              <a:t>2</a:t>
+              <a:t>1</a:t>
             </a:fld>
             <a:endParaRPr lang="en-US"/>
           </a:p>
@@ -577,7 +544,7 @@
     </p:spTree>
     <p:extLst>
       <p:ext uri="{BB962C8B-B14F-4D97-AF65-F5344CB8AC3E}">
-        <p14:creationId xmlns:p14="http://schemas.microsoft.com/office/powerpoint/2010/main" val="3067887126"/>
+        <p14:creationId xmlns:p14="http://schemas.microsoft.com/office/powerpoint/2010/main" val="143537066"/>
       </p:ext>
     </p:extLst>
   </p:cSld>
@@ -631,126 +598,118 @@
           <a:bodyPr/>
           <a:lstStyle/>
           <a:p>
-            <a:pPr marL="171450" indent="-171450">
+            <a:r>
+              <a:rPr lang="en-US" baseline="0" dirty="0" smtClean="0"/>
+              <a:t>Nevertheless, we have </a:t>
+            </a:r>
+            <a:r>
+              <a:rPr lang="en-US" dirty="0" smtClean="0"/>
+              <a:t>attempted to model weather events using a second order Hidden</a:t>
+            </a:r>
+            <a:r>
+              <a:rPr lang="en-US" baseline="0" dirty="0" smtClean="0"/>
+              <a:t> Markov Model. Our model has </a:t>
+            </a:r>
+            <a:r>
+              <a:rPr lang="en-US" dirty="0" smtClean="0"/>
+              <a:t>9 hidden states representing weather events and 7 continuous</a:t>
+            </a:r>
+            <a:r>
+              <a:rPr lang="en-US" baseline="0" dirty="0" smtClean="0"/>
+              <a:t> real-valued weather measures as observations. The observations have been modeled using Gaussian and Log-Normal distributions and the emissions probability is derived from a multivariate Gaussian. </a:t>
+            </a:r>
+          </a:p>
+        </p:txBody>
+      </p:sp>
+      <p:sp>
+        <p:nvSpPr>
+          <p:cNvPr id="4" name="Slide Number Placeholder 3"/>
+          <p:cNvSpPr>
+            <a:spLocks noGrp="1"/>
+          </p:cNvSpPr>
+          <p:nvPr>
+            <p:ph type="sldNum" sz="quarter" idx="10"/>
+          </p:nvPr>
+        </p:nvSpPr>
+        <p:spPr/>
+        <p:txBody>
+          <a:bodyPr/>
+          <a:lstStyle/>
+          <a:p>
+            <a:fld id="{855C7538-5F66-FD46-9CCD-0484E66EB419}" type="slidenum">
+              <a:rPr lang="en-US" smtClean="0"/>
+              <a:t>2</a:t>
+            </a:fld>
+            <a:endParaRPr lang="en-US"/>
+          </a:p>
+        </p:txBody>
+      </p:sp>
+    </p:spTree>
+    <p:extLst>
+      <p:ext uri="{BB962C8B-B14F-4D97-AF65-F5344CB8AC3E}">
+        <p14:creationId xmlns:p14="http://schemas.microsoft.com/office/powerpoint/2010/main" val="3067887126"/>
+      </p:ext>
+    </p:extLst>
+  </p:cSld>
+  <p:clrMapOvr>
+    <a:masterClrMapping/>
+  </p:clrMapOvr>
+</p:notes>
+</file>
+
+<file path=ppt/notesSlides/notesSlide3.xml><?xml version="1.0" encoding="utf-8"?>
+<p:notes xmlns:a="http://schemas.openxmlformats.org/drawingml/2006/main" xmlns:r="http://schemas.openxmlformats.org/officeDocument/2006/relationships" xmlns:p="http://schemas.openxmlformats.org/presentationml/2006/main">
+  <p:cSld>
+    <p:spTree>
+      <p:nvGrpSpPr>
+        <p:cNvPr id="1" name=""/>
+        <p:cNvGrpSpPr/>
+        <p:nvPr/>
+      </p:nvGrpSpPr>
+      <p:grpSpPr>
+        <a:xfrm>
+          <a:off x="0" y="0"/>
+          <a:ext cx="0" cy="0"/>
+          <a:chOff x="0" y="0"/>
+          <a:chExt cx="0" cy="0"/>
+        </a:xfrm>
+      </p:grpSpPr>
+      <p:sp>
+        <p:nvSpPr>
+          <p:cNvPr id="2" name="Slide Image Placeholder 1"/>
+          <p:cNvSpPr>
+            <a:spLocks noGrp="1" noRot="1" noChangeAspect="1"/>
+          </p:cNvSpPr>
+          <p:nvPr>
+            <p:ph type="sldImg"/>
+          </p:nvPr>
+        </p:nvSpPr>
+        <p:spPr/>
+      </p:sp>
+      <p:sp>
+        <p:nvSpPr>
+          <p:cNvPr id="3" name="Notes Placeholder 2"/>
+          <p:cNvSpPr>
+            <a:spLocks noGrp="1"/>
+          </p:cNvSpPr>
+          <p:nvPr>
+            <p:ph type="body" idx="1"/>
+          </p:nvPr>
+        </p:nvSpPr>
+        <p:spPr/>
+        <p:txBody>
+          <a:bodyPr/>
+          <a:lstStyle/>
+          <a:p>
+            <a:r>
+              <a:rPr lang="en-US" baseline="0" dirty="0" smtClean="0"/>
+              <a:t>The model was trained on 50 years of data and tested on the next five years and produced an average inference accuracy of 65%. It did especially well to infer extreme events like thunderstorms and specific events like fog days.</a:t>
+            </a:r>
+          </a:p>
+          <a:p>
+            <a:pPr marL="0" indent="0">
               <a:buFontTx/>
-              <a:buChar char="-"/>
-            </a:pPr>
-            <a:r>
-              <a:rPr lang="en-US" dirty="0" smtClean="0"/>
-              <a:t>Dataset – Weather measure data for Boston over the past 55 years</a:t>
-            </a:r>
-          </a:p>
-          <a:p>
-            <a:pPr marL="171450" indent="-171450">
-              <a:buFontTx/>
-              <a:buChar char="-"/>
-            </a:pPr>
-            <a:r>
-              <a:rPr lang="en-US" dirty="0" smtClean="0"/>
-              <a:t>Training – first</a:t>
-            </a:r>
-            <a:r>
-              <a:rPr lang="en-US" baseline="0" dirty="0" smtClean="0"/>
-              <a:t> 50 years, test on the next 5 years </a:t>
-            </a:r>
-          </a:p>
-          <a:p>
-            <a:pPr marL="171450" indent="-171450">
-              <a:buFontTx/>
-              <a:buChar char="-"/>
-            </a:pPr>
-            <a:r>
-              <a:rPr lang="en-US" baseline="0" dirty="0" smtClean="0"/>
-              <a:t>TP – tracked over the entire training period – studied its </a:t>
-            </a:r>
-            <a:r>
-              <a:rPr lang="en-US" baseline="0" dirty="0" err="1" smtClean="0"/>
-              <a:t>stationarity</a:t>
-            </a:r>
-            <a:endParaRPr lang="en-US" baseline="0" dirty="0" smtClean="0"/>
-          </a:p>
-          <a:p>
-            <a:pPr marL="171450" indent="-171450">
-              <a:buFontTx/>
-              <a:buChar char="-"/>
-            </a:pPr>
-            <a:r>
-              <a:rPr lang="en-US" baseline="0" dirty="0" smtClean="0"/>
-              <a:t>EP – for each state – multivariate normal represents EP for the 7 observations made</a:t>
-            </a:r>
-          </a:p>
-          <a:p>
-            <a:pPr marL="171450" indent="-171450">
-              <a:buFontTx/>
-              <a:buChar char="-"/>
-            </a:pPr>
-            <a:r>
-              <a:rPr lang="en-US" baseline="0" dirty="0" smtClean="0"/>
-              <a:t>The multivariate normal constructed from underlying </a:t>
-            </a:r>
-            <a:r>
-              <a:rPr lang="en-US" baseline="0" dirty="0" err="1" smtClean="0"/>
-              <a:t>gaussian</a:t>
-            </a:r>
-            <a:r>
-              <a:rPr lang="en-US" baseline="0" dirty="0" smtClean="0"/>
-              <a:t> and log-normal distributions representing each of the 7 real-valued weather measures</a:t>
-            </a:r>
-          </a:p>
-          <a:p>
-            <a:pPr marL="171450" indent="-171450">
-              <a:buFontTx/>
-              <a:buChar char="-"/>
-            </a:pPr>
-            <a:r>
-              <a:rPr lang="en-US" baseline="0" dirty="0" smtClean="0"/>
-              <a:t>Results – overall inference accuracy of 65%</a:t>
-            </a:r>
-          </a:p>
-          <a:p>
-            <a:pPr marL="171450" indent="-171450">
-              <a:buFontTx/>
-              <a:buChar char="-"/>
-            </a:pPr>
-            <a:r>
-              <a:rPr lang="en-US" baseline="0" dirty="0" smtClean="0"/>
-              <a:t>Specifically, inferred normal days, extreme events like thunderstorms and specific events like Fog</a:t>
-            </a:r>
-          </a:p>
-          <a:p>
-            <a:pPr marL="171450" indent="-171450">
-              <a:buFontTx/>
-              <a:buChar char="-"/>
-            </a:pPr>
-            <a:r>
-              <a:rPr lang="en-US" baseline="0" dirty="0" smtClean="0"/>
-              <a:t>Model did less well on highly overlapping events like Rain, Rain-Snow, Fog-Snow etc. However, still considerable better than a naïve baseline.</a:t>
-            </a:r>
-          </a:p>
-          <a:p>
-            <a:pPr marL="171450" indent="-171450">
-              <a:buFontTx/>
-              <a:buChar char="-"/>
-            </a:pPr>
-            <a:r>
-              <a:rPr lang="en-US" baseline="0" dirty="0" smtClean="0"/>
-              <a:t>Confusion matrix to represent nature of error (not all labels are equidistant; ordering exists)</a:t>
-            </a:r>
-          </a:p>
-          <a:p>
-            <a:pPr marL="171450" indent="-171450">
-              <a:buFontTx/>
-              <a:buChar char="-"/>
-            </a:pPr>
-            <a:r>
-              <a:rPr lang="en-US" baseline="0" dirty="0" smtClean="0"/>
-              <a:t>Further improve with - a third order model, better/more parameters, better EP/TP</a:t>
-            </a:r>
-          </a:p>
-          <a:p>
-            <a:pPr marL="171450" indent="-171450">
-              <a:buFontTx/>
-              <a:buChar char="-"/>
+              <a:buNone/>
             </a:pPr>
             <a:endParaRPr lang="en-US" dirty="0"/>
           </a:p>
@@ -3803,7 +3762,7 @@
             <p:nvPr/>
           </p:nvPicPr>
           <p:blipFill>
-            <a:blip r:embed="rId2">
+            <a:blip r:embed="rId3">
               <a:extLst>
                 <a:ext uri="{28A0092B-C50C-407E-A947-70E740481C1C}">
                   <a14:useLocalDpi xmlns:a14="http://schemas.microsoft.com/office/drawing/2010/main" val="0"/>

</xml_diff>